<commit_message>
Update on 2021-12-28 meetings
</commit_message>
<xml_diff>
--- a/docs/usage/project-management/src/document/Ch1.2-document.pptx
+++ b/docs/usage/project-management/src/document/Ch1.2-document.pptx
@@ -5,20 +5,21 @@
     <p:sldMasterId id="2147483648" r:id="rId1"/>
   </p:sldMasterIdLst>
   <p:notesMasterIdLst>
-    <p:notesMasterId r:id="rId13"/>
+    <p:notesMasterId r:id="rId14"/>
   </p:notesMasterIdLst>
   <p:sldIdLst>
     <p:sldId id="256" r:id="rId2"/>
     <p:sldId id="266" r:id="rId3"/>
     <p:sldId id="257" r:id="rId4"/>
-    <p:sldId id="258" r:id="rId5"/>
-    <p:sldId id="259" r:id="rId6"/>
-    <p:sldId id="260" r:id="rId7"/>
-    <p:sldId id="261" r:id="rId8"/>
-    <p:sldId id="262" r:id="rId9"/>
-    <p:sldId id="263" r:id="rId10"/>
-    <p:sldId id="264" r:id="rId11"/>
-    <p:sldId id="265" r:id="rId12"/>
+    <p:sldId id="267" r:id="rId5"/>
+    <p:sldId id="258" r:id="rId6"/>
+    <p:sldId id="259" r:id="rId7"/>
+    <p:sldId id="260" r:id="rId8"/>
+    <p:sldId id="261" r:id="rId9"/>
+    <p:sldId id="262" r:id="rId10"/>
+    <p:sldId id="263" r:id="rId11"/>
+    <p:sldId id="264" r:id="rId12"/>
+    <p:sldId id="265" r:id="rId13"/>
   </p:sldIdLst>
   <p:sldSz cx="12192000" cy="6858000"/>
   <p:notesSz cx="6858000" cy="9144000"/>
@@ -6406,7 +6407,7 @@
           <a:p>
             <a:fld id="{3BDC3A67-6114-46AE-8914-87077F8B821F}" type="datetimeFigureOut">
               <a:rPr lang="en-US" smtClean="0"/>
-              <a:t>7/16/2021</a:t>
+              <a:t>12/28/2021</a:t>
             </a:fld>
             <a:endParaRPr lang="en-US"/>
           </a:p>
@@ -6739,7 +6740,91 @@
           <a:p>
             <a:fld id="{C2580B49-4247-4946-993A-87FFB14B2B1E}" type="slidenum">
               <a:rPr lang="en-US" smtClean="0"/>
-              <a:t>6</a:t>
+              <a:t>2</a:t>
+            </a:fld>
+            <a:endParaRPr lang="en-US"/>
+          </a:p>
+        </p:txBody>
+      </p:sp>
+    </p:spTree>
+    <p:extLst>
+      <p:ext uri="{BB962C8B-B14F-4D97-AF65-F5344CB8AC3E}">
+        <p14:creationId xmlns:p14="http://schemas.microsoft.com/office/powerpoint/2010/main" val="1348338645"/>
+      </p:ext>
+    </p:extLst>
+  </p:cSld>
+  <p:clrMapOvr>
+    <a:masterClrMapping/>
+  </p:clrMapOvr>
+</p:notes>
+</file>
+
+<file path=ppt/notesSlides/notesSlide2.xml><?xml version="1.0" encoding="utf-8"?>
+<p:notes xmlns:a="http://schemas.openxmlformats.org/drawingml/2006/main" xmlns:r="http://schemas.openxmlformats.org/officeDocument/2006/relationships" xmlns:p="http://schemas.openxmlformats.org/presentationml/2006/main">
+  <p:cSld>
+    <p:spTree>
+      <p:nvGrpSpPr>
+        <p:cNvPr id="1" name=""/>
+        <p:cNvGrpSpPr/>
+        <p:nvPr/>
+      </p:nvGrpSpPr>
+      <p:grpSpPr>
+        <a:xfrm>
+          <a:off x="0" y="0"/>
+          <a:ext cx="0" cy="0"/>
+          <a:chOff x="0" y="0"/>
+          <a:chExt cx="0" cy="0"/>
+        </a:xfrm>
+      </p:grpSpPr>
+      <p:sp>
+        <p:nvSpPr>
+          <p:cNvPr id="2" name="幻灯片图像占位符 1"/>
+          <p:cNvSpPr>
+            <a:spLocks noGrp="1" noRot="1" noChangeAspect="1"/>
+          </p:cNvSpPr>
+          <p:nvPr>
+            <p:ph type="sldImg"/>
+          </p:nvPr>
+        </p:nvSpPr>
+        <p:spPr/>
+      </p:sp>
+      <p:sp>
+        <p:nvSpPr>
+          <p:cNvPr id="3" name="备注占位符 2"/>
+          <p:cNvSpPr>
+            <a:spLocks noGrp="1"/>
+          </p:cNvSpPr>
+          <p:nvPr>
+            <p:ph type="body" idx="1"/>
+          </p:nvPr>
+        </p:nvSpPr>
+        <p:spPr/>
+        <p:txBody>
+          <a:bodyPr/>
+          <a:lstStyle/>
+          <a:p>
+            <a:endParaRPr lang="en-US" dirty="0"/>
+          </a:p>
+        </p:txBody>
+      </p:sp>
+      <p:sp>
+        <p:nvSpPr>
+          <p:cNvPr id="4" name="灯片编号占位符 3"/>
+          <p:cNvSpPr>
+            <a:spLocks noGrp="1"/>
+          </p:cNvSpPr>
+          <p:nvPr>
+            <p:ph type="sldNum" sz="quarter" idx="5"/>
+          </p:nvPr>
+        </p:nvSpPr>
+        <p:spPr/>
+        <p:txBody>
+          <a:bodyPr/>
+          <a:lstStyle/>
+          <a:p>
+            <a:fld id="{C2580B49-4247-4946-993A-87FFB14B2B1E}" type="slidenum">
+              <a:rPr lang="en-US" smtClean="0"/>
+              <a:t>7</a:t>
             </a:fld>
             <a:endParaRPr lang="en-US"/>
           </a:p>
@@ -6907,7 +6992,7 @@
           <a:p>
             <a:fld id="{AAFD2540-F50C-42BD-B13C-BD9CE909D8C1}" type="datetimeFigureOut">
               <a:rPr lang="en-US" smtClean="0"/>
-              <a:t>7/16/2021</a:t>
+              <a:t>12/28/2021</a:t>
             </a:fld>
             <a:endParaRPr lang="en-US"/>
           </a:p>
@@ -7107,7 +7192,7 @@
           <a:p>
             <a:fld id="{AAFD2540-F50C-42BD-B13C-BD9CE909D8C1}" type="datetimeFigureOut">
               <a:rPr lang="en-US" smtClean="0"/>
-              <a:t>7/16/2021</a:t>
+              <a:t>12/28/2021</a:t>
             </a:fld>
             <a:endParaRPr lang="en-US"/>
           </a:p>
@@ -7317,7 +7402,7 @@
           <a:p>
             <a:fld id="{AAFD2540-F50C-42BD-B13C-BD9CE909D8C1}" type="datetimeFigureOut">
               <a:rPr lang="en-US" smtClean="0"/>
-              <a:t>7/16/2021</a:t>
+              <a:t>12/28/2021</a:t>
             </a:fld>
             <a:endParaRPr lang="en-US"/>
           </a:p>
@@ -7517,7 +7602,7 @@
           <a:p>
             <a:fld id="{AAFD2540-F50C-42BD-B13C-BD9CE909D8C1}" type="datetimeFigureOut">
               <a:rPr lang="en-US" smtClean="0"/>
-              <a:t>7/16/2021</a:t>
+              <a:t>12/28/2021</a:t>
             </a:fld>
             <a:endParaRPr lang="en-US"/>
           </a:p>
@@ -7793,7 +7878,7 @@
           <a:p>
             <a:fld id="{AAFD2540-F50C-42BD-B13C-BD9CE909D8C1}" type="datetimeFigureOut">
               <a:rPr lang="en-US" smtClean="0"/>
-              <a:t>7/16/2021</a:t>
+              <a:t>12/28/2021</a:t>
             </a:fld>
             <a:endParaRPr lang="en-US"/>
           </a:p>
@@ -8061,7 +8146,7 @@
           <a:p>
             <a:fld id="{AAFD2540-F50C-42BD-B13C-BD9CE909D8C1}" type="datetimeFigureOut">
               <a:rPr lang="en-US" smtClean="0"/>
-              <a:t>7/16/2021</a:t>
+              <a:t>12/28/2021</a:t>
             </a:fld>
             <a:endParaRPr lang="en-US"/>
           </a:p>
@@ -8476,7 +8561,7 @@
           <a:p>
             <a:fld id="{AAFD2540-F50C-42BD-B13C-BD9CE909D8C1}" type="datetimeFigureOut">
               <a:rPr lang="en-US" smtClean="0"/>
-              <a:t>7/16/2021</a:t>
+              <a:t>12/28/2021</a:t>
             </a:fld>
             <a:endParaRPr lang="en-US"/>
           </a:p>
@@ -8618,7 +8703,7 @@
           <a:p>
             <a:fld id="{AAFD2540-F50C-42BD-B13C-BD9CE909D8C1}" type="datetimeFigureOut">
               <a:rPr lang="en-US" smtClean="0"/>
-              <a:t>7/16/2021</a:t>
+              <a:t>12/28/2021</a:t>
             </a:fld>
             <a:endParaRPr lang="en-US"/>
           </a:p>
@@ -8731,7 +8816,7 @@
           <a:p>
             <a:fld id="{AAFD2540-F50C-42BD-B13C-BD9CE909D8C1}" type="datetimeFigureOut">
               <a:rPr lang="en-US" smtClean="0"/>
-              <a:t>7/16/2021</a:t>
+              <a:t>12/28/2021</a:t>
             </a:fld>
             <a:endParaRPr lang="en-US"/>
           </a:p>
@@ -9044,7 +9129,7 @@
           <a:p>
             <a:fld id="{AAFD2540-F50C-42BD-B13C-BD9CE909D8C1}" type="datetimeFigureOut">
               <a:rPr lang="en-US" smtClean="0"/>
-              <a:t>7/16/2021</a:t>
+              <a:t>12/28/2021</a:t>
             </a:fld>
             <a:endParaRPr lang="en-US"/>
           </a:p>
@@ -9333,7 +9418,7 @@
           <a:p>
             <a:fld id="{AAFD2540-F50C-42BD-B13C-BD9CE909D8C1}" type="datetimeFigureOut">
               <a:rPr lang="en-US" smtClean="0"/>
-              <a:t>7/16/2021</a:t>
+              <a:t>12/28/2021</a:t>
             </a:fld>
             <a:endParaRPr lang="en-US"/>
           </a:p>
@@ -9576,7 +9661,7 @@
           <a:p>
             <a:fld id="{AAFD2540-F50C-42BD-B13C-BD9CE909D8C1}" type="datetimeFigureOut">
               <a:rPr lang="en-US" smtClean="0"/>
-              <a:t>7/16/2021</a:t>
+              <a:t>12/28/2021</a:t>
             </a:fld>
             <a:endParaRPr lang="en-US"/>
           </a:p>
@@ -10143,6 +10228,390 @@
           <p:cNvPr id="2" name="标题 1">
             <a:extLst>
               <a:ext uri="{FF2B5EF4-FFF2-40B4-BE49-F238E27FC236}">
+                <a16:creationId xmlns:a16="http://schemas.microsoft.com/office/drawing/2014/main" id="{3FE14FCF-5B8C-4C99-A6C9-A0016EF71719}"/>
+              </a:ext>
+            </a:extLst>
+          </p:cNvPr>
+          <p:cNvSpPr>
+            <a:spLocks noGrp="1"/>
+          </p:cNvSpPr>
+          <p:nvPr>
+            <p:ph type="title"/>
+          </p:nvPr>
+        </p:nvSpPr>
+        <p:spPr/>
+        <p:txBody>
+          <a:bodyPr/>
+          <a:lstStyle/>
+          <a:p>
+            <a:r>
+              <a:rPr lang="en-US" dirty="0"/>
+              <a:t>Sphinx Doc Writing – Start Your Doc</a:t>
+            </a:r>
+          </a:p>
+        </p:txBody>
+      </p:sp>
+      <p:sp>
+        <p:nvSpPr>
+          <p:cNvPr id="3" name="内容占位符 2">
+            <a:extLst>
+              <a:ext uri="{FF2B5EF4-FFF2-40B4-BE49-F238E27FC236}">
+                <a16:creationId xmlns:a16="http://schemas.microsoft.com/office/drawing/2014/main" id="{E47B3EE0-65ED-4194-94F1-A81E60912DD6}"/>
+              </a:ext>
+            </a:extLst>
+          </p:cNvPr>
+          <p:cNvSpPr>
+            <a:spLocks noGrp="1"/>
+          </p:cNvSpPr>
+          <p:nvPr>
+            <p:ph idx="1"/>
+          </p:nvPr>
+        </p:nvSpPr>
+        <p:spPr>
+          <a:xfrm>
+            <a:off x="838200" y="1825625"/>
+            <a:ext cx="5879400" cy="4351338"/>
+          </a:xfrm>
+        </p:spPr>
+        <p:txBody>
+          <a:bodyPr>
+            <a:normAutofit/>
+          </a:bodyPr>
+          <a:lstStyle/>
+          <a:p>
+            <a:r>
+              <a:rPr lang="en-US" dirty="0"/>
+              <a:t>Install required packages</a:t>
+            </a:r>
+          </a:p>
+          <a:p>
+            <a:pPr lvl="1"/>
+            <a:r>
+              <a:rPr lang="en-US" sz="1800" dirty="0"/>
+              <a:t>Build a new virtual environment, if possible.</a:t>
+            </a:r>
+          </a:p>
+          <a:p>
+            <a:pPr lvl="1"/>
+            <a:r>
+              <a:rPr lang="en-US" sz="1800" dirty="0">
+                <a:latin typeface="Consolas" panose="020B0609020204030204" pitchFamily="49" charset="0"/>
+              </a:rPr>
+              <a:t>pip</a:t>
+            </a:r>
+            <a:r>
+              <a:rPr lang="zh-CN" altLang="en-US" sz="1800" dirty="0">
+                <a:latin typeface="Consolas" panose="020B0609020204030204" pitchFamily="49" charset="0"/>
+              </a:rPr>
+              <a:t> </a:t>
+            </a:r>
+            <a:r>
+              <a:rPr lang="en-US" altLang="zh-CN" sz="1800" dirty="0">
+                <a:latin typeface="Consolas" panose="020B0609020204030204" pitchFamily="49" charset="0"/>
+              </a:rPr>
+              <a:t>install sphinx</a:t>
+            </a:r>
+            <a:r>
+              <a:rPr lang="en-US" altLang="zh-CN" sz="1800" dirty="0"/>
+              <a:t> </a:t>
+            </a:r>
+            <a:br>
+              <a:rPr lang="en-US" altLang="zh-CN" sz="1800" dirty="0"/>
+            </a:br>
+            <a:r>
+              <a:rPr lang="en-US" altLang="zh-CN" sz="1800" dirty="0"/>
+              <a:t>=&gt; (doc-parser library)</a:t>
+            </a:r>
+          </a:p>
+          <a:p>
+            <a:pPr lvl="1"/>
+            <a:r>
+              <a:rPr lang="en-US" sz="1800" dirty="0">
+                <a:latin typeface="Consolas" panose="020B0609020204030204" pitchFamily="49" charset="0"/>
+              </a:rPr>
+              <a:t>pip install sphinx-</a:t>
+            </a:r>
+            <a:r>
+              <a:rPr lang="en-US" sz="1800" dirty="0" err="1">
+                <a:latin typeface="Consolas" panose="020B0609020204030204" pitchFamily="49" charset="0"/>
+              </a:rPr>
+              <a:t>rtd</a:t>
+            </a:r>
+            <a:r>
+              <a:rPr lang="en-US" sz="1800" dirty="0">
+                <a:latin typeface="Consolas" panose="020B0609020204030204" pitchFamily="49" charset="0"/>
+              </a:rPr>
+              <a:t>-theme</a:t>
+            </a:r>
+            <a:r>
+              <a:rPr lang="en-US" sz="1800" dirty="0"/>
+              <a:t> </a:t>
+            </a:r>
+            <a:br>
+              <a:rPr lang="en-US" sz="1800" dirty="0"/>
+            </a:br>
+            <a:r>
+              <a:rPr lang="en-US" sz="1800" dirty="0"/>
+              <a:t>=&gt; (a widely-used theme)</a:t>
+            </a:r>
+          </a:p>
+          <a:p>
+            <a:r>
+              <a:rPr lang="en-US" dirty="0"/>
+              <a:t>Start a new Sphinx project</a:t>
+            </a:r>
+          </a:p>
+          <a:p>
+            <a:pPr lvl="1"/>
+            <a:r>
+              <a:rPr lang="en-US" sz="1800" dirty="0" err="1">
+                <a:latin typeface="Consolas" panose="020B0609020204030204" pitchFamily="49" charset="0"/>
+              </a:rPr>
+              <a:t>mkdir</a:t>
+            </a:r>
+            <a:r>
+              <a:rPr lang="en-US" sz="1800" dirty="0">
+                <a:latin typeface="Consolas" panose="020B0609020204030204" pitchFamily="49" charset="0"/>
+              </a:rPr>
+              <a:t> example &amp;&amp; cd example</a:t>
+            </a:r>
+            <a:br>
+              <a:rPr lang="en-US" sz="1800" dirty="0"/>
+            </a:br>
+            <a:r>
+              <a:rPr lang="en-US" altLang="zh-CN" sz="1800" dirty="0"/>
+              <a:t>=&gt; project root directory</a:t>
+            </a:r>
+            <a:endParaRPr lang="en-US" sz="1800" dirty="0"/>
+          </a:p>
+          <a:p>
+            <a:pPr lvl="1"/>
+            <a:r>
+              <a:rPr lang="en-US" sz="1800" dirty="0">
+                <a:latin typeface="Consolas" panose="020B0609020204030204" pitchFamily="49" charset="0"/>
+              </a:rPr>
+              <a:t>sphinx-</a:t>
+            </a:r>
+            <a:r>
+              <a:rPr lang="en-US" sz="1800" dirty="0" err="1">
+                <a:latin typeface="Consolas" panose="020B0609020204030204" pitchFamily="49" charset="0"/>
+              </a:rPr>
+              <a:t>quickstart</a:t>
+            </a:r>
+            <a:br>
+              <a:rPr lang="en-US" sz="1800" dirty="0"/>
+            </a:br>
+            <a:r>
+              <a:rPr lang="en-US" sz="1800" dirty="0"/>
+              <a:t>=&gt; get an empty project</a:t>
+            </a:r>
+          </a:p>
+        </p:txBody>
+      </p:sp>
+      <p:sp>
+        <p:nvSpPr>
+          <p:cNvPr id="11" name="矩形 10">
+            <a:extLst>
+              <a:ext uri="{FF2B5EF4-FFF2-40B4-BE49-F238E27FC236}">
+                <a16:creationId xmlns:a16="http://schemas.microsoft.com/office/drawing/2014/main" id="{9B8CBADC-8460-417A-8FAD-BBB0736C082B}"/>
+              </a:ext>
+            </a:extLst>
+          </p:cNvPr>
+          <p:cNvSpPr/>
+          <p:nvPr/>
+        </p:nvSpPr>
+        <p:spPr>
+          <a:xfrm>
+            <a:off x="6717600" y="2575539"/>
+            <a:ext cx="5299200" cy="2585323"/>
+          </a:xfrm>
+          <a:prstGeom prst="rect">
+            <a:avLst/>
+          </a:prstGeom>
+          <a:noFill/>
+          <a:ln w="9525" cap="flat" cmpd="sng" algn="ctr">
+            <a:solidFill>
+              <a:schemeClr val="accent1"/>
+            </a:solidFill>
+            <a:prstDash val="solid"/>
+            <a:round/>
+            <a:headEnd type="none" w="med" len="med"/>
+            <a:tailEnd type="none" w="med" len="med"/>
+          </a:ln>
+        </p:spPr>
+        <p:style>
+          <a:lnRef idx="0">
+            <a:scrgbClr r="0" g="0" b="0"/>
+          </a:lnRef>
+          <a:fillRef idx="0">
+            <a:scrgbClr r="0" g="0" b="0"/>
+          </a:fillRef>
+          <a:effectRef idx="0">
+            <a:scrgbClr r="0" g="0" b="0"/>
+          </a:effectRef>
+          <a:fontRef idx="minor">
+            <a:schemeClr val="accent1"/>
+          </a:fontRef>
+        </p:style>
+        <p:txBody>
+          <a:bodyPr wrap="square">
+            <a:spAutoFit/>
+          </a:bodyPr>
+          <a:lstStyle/>
+          <a:p>
+            <a:r>
+              <a:rPr lang="en-US" altLang="zh-CN" dirty="0">
+                <a:latin typeface="Consolas" panose="020B0609020204030204" pitchFamily="49" charset="0"/>
+              </a:rPr>
+              <a:t># Project layout after sphinx-</a:t>
+            </a:r>
+            <a:r>
+              <a:rPr lang="en-US" altLang="zh-CN" dirty="0" err="1">
+                <a:latin typeface="Consolas" panose="020B0609020204030204" pitchFamily="49" charset="0"/>
+              </a:rPr>
+              <a:t>quickstart</a:t>
+            </a:r>
+            <a:endParaRPr lang="en-US" altLang="zh-CN" dirty="0">
+              <a:latin typeface="Consolas" panose="020B0609020204030204" pitchFamily="49" charset="0"/>
+            </a:endParaRPr>
+          </a:p>
+          <a:p>
+            <a:r>
+              <a:rPr lang="en-US" altLang="zh-CN" dirty="0">
+                <a:latin typeface="Consolas" panose="020B0609020204030204" pitchFamily="49" charset="0"/>
+              </a:rPr>
+              <a:t>example</a:t>
+            </a:r>
+            <a:br>
+              <a:rPr lang="en-US" altLang="zh-CN" dirty="0">
+                <a:latin typeface="Consolas" panose="020B0609020204030204" pitchFamily="49" charset="0"/>
+              </a:rPr>
+            </a:br>
+            <a:r>
+              <a:rPr lang="en-US" altLang="zh-CN" dirty="0">
+                <a:latin typeface="Consolas" panose="020B0609020204030204" pitchFamily="49" charset="0"/>
+              </a:rPr>
+              <a:t>  |- _build/</a:t>
+            </a:r>
+            <a:br>
+              <a:rPr lang="en-US" altLang="zh-CN" dirty="0">
+                <a:latin typeface="Consolas" panose="020B0609020204030204" pitchFamily="49" charset="0"/>
+              </a:rPr>
+            </a:br>
+            <a:r>
+              <a:rPr lang="en-US" altLang="zh-CN" dirty="0">
+                <a:latin typeface="Consolas" panose="020B0609020204030204" pitchFamily="49" charset="0"/>
+              </a:rPr>
+              <a:t>  |- _static/</a:t>
+            </a:r>
+            <a:br>
+              <a:rPr lang="en-US" altLang="zh-CN" dirty="0">
+                <a:latin typeface="Consolas" panose="020B0609020204030204" pitchFamily="49" charset="0"/>
+              </a:rPr>
+            </a:br>
+            <a:r>
+              <a:rPr lang="en-US" altLang="zh-CN" dirty="0">
+                <a:latin typeface="Consolas" panose="020B0609020204030204" pitchFamily="49" charset="0"/>
+              </a:rPr>
+              <a:t>  |- _templates/</a:t>
+            </a:r>
+            <a:br>
+              <a:rPr lang="en-US" altLang="zh-CN" dirty="0">
+                <a:latin typeface="Consolas" panose="020B0609020204030204" pitchFamily="49" charset="0"/>
+              </a:rPr>
+            </a:br>
+            <a:r>
+              <a:rPr lang="en-US" altLang="zh-CN" dirty="0">
+                <a:latin typeface="Consolas" panose="020B0609020204030204" pitchFamily="49" charset="0"/>
+              </a:rPr>
+              <a:t>  |- conf.py</a:t>
+            </a:r>
+            <a:br>
+              <a:rPr lang="en-US" altLang="zh-CN" dirty="0">
+                <a:latin typeface="Consolas" panose="020B0609020204030204" pitchFamily="49" charset="0"/>
+              </a:rPr>
+            </a:br>
+            <a:r>
+              <a:rPr lang="en-US" altLang="zh-CN" dirty="0">
+                <a:latin typeface="Consolas" panose="020B0609020204030204" pitchFamily="49" charset="0"/>
+              </a:rPr>
+              <a:t>  |- </a:t>
+            </a:r>
+            <a:r>
+              <a:rPr lang="en-US" altLang="zh-CN" dirty="0" err="1">
+                <a:latin typeface="Consolas" panose="020B0609020204030204" pitchFamily="49" charset="0"/>
+              </a:rPr>
+              <a:t>index.rst</a:t>
+            </a:r>
+            <a:br>
+              <a:rPr lang="en-US" altLang="zh-CN" dirty="0">
+                <a:latin typeface="Consolas" panose="020B0609020204030204" pitchFamily="49" charset="0"/>
+              </a:rPr>
+            </a:br>
+            <a:r>
+              <a:rPr lang="en-US" altLang="zh-CN" dirty="0">
+                <a:latin typeface="Consolas" panose="020B0609020204030204" pitchFamily="49" charset="0"/>
+              </a:rPr>
+              <a:t>  |- make.bat</a:t>
+            </a:r>
+            <a:br>
+              <a:rPr lang="en-US" altLang="zh-CN" dirty="0">
+                <a:latin typeface="Consolas" panose="020B0609020204030204" pitchFamily="49" charset="0"/>
+              </a:rPr>
+            </a:br>
+            <a:r>
+              <a:rPr lang="en-US" altLang="zh-CN" dirty="0">
+                <a:latin typeface="Consolas" panose="020B0609020204030204" pitchFamily="49" charset="0"/>
+              </a:rPr>
+              <a:t>  |- </a:t>
+            </a:r>
+            <a:r>
+              <a:rPr lang="en-US" altLang="zh-CN" dirty="0" err="1">
+                <a:latin typeface="Consolas" panose="020B0609020204030204" pitchFamily="49" charset="0"/>
+              </a:rPr>
+              <a:t>Makefile</a:t>
+            </a:r>
+            <a:endParaRPr lang="zh-CN" altLang="en-US" dirty="0">
+              <a:latin typeface="Consolas" panose="020B0609020204030204" pitchFamily="49" charset="0"/>
+            </a:endParaRPr>
+          </a:p>
+        </p:txBody>
+      </p:sp>
+    </p:spTree>
+    <p:extLst>
+      <p:ext uri="{BB962C8B-B14F-4D97-AF65-F5344CB8AC3E}">
+        <p14:creationId xmlns:p14="http://schemas.microsoft.com/office/powerpoint/2010/main" val="2766636"/>
+      </p:ext>
+    </p:extLst>
+  </p:cSld>
+  <p:clrMapOvr>
+    <a:masterClrMapping/>
+  </p:clrMapOvr>
+</p:sld>
+</file>
+
+<file path=ppt/slides/slide11.xml><?xml version="1.0" encoding="utf-8"?>
+<p:sld xmlns:a="http://schemas.openxmlformats.org/drawingml/2006/main" xmlns:r="http://schemas.openxmlformats.org/officeDocument/2006/relationships" xmlns:p="http://schemas.openxmlformats.org/presentationml/2006/main">
+  <p:cSld>
+    <p:spTree>
+      <p:nvGrpSpPr>
+        <p:cNvPr id="1" name=""/>
+        <p:cNvGrpSpPr/>
+        <p:nvPr/>
+      </p:nvGrpSpPr>
+      <p:grpSpPr>
+        <a:xfrm>
+          <a:off x="0" y="0"/>
+          <a:ext cx="0" cy="0"/>
+          <a:chOff x="0" y="0"/>
+          <a:chExt cx="0" cy="0"/>
+        </a:xfrm>
+      </p:grpSpPr>
+      <p:sp>
+        <p:nvSpPr>
+          <p:cNvPr id="2" name="标题 1">
+            <a:extLst>
+              <a:ext uri="{FF2B5EF4-FFF2-40B4-BE49-F238E27FC236}">
                 <a16:creationId xmlns:a16="http://schemas.microsoft.com/office/drawing/2014/main" id="{CCF9D302-ED29-4717-A624-899EDC58E696}"/>
               </a:ext>
             </a:extLst>
@@ -10452,7 +10921,7 @@
 </p:sld>
 </file>
 
-<file path=ppt/slides/slide11.xml><?xml version="1.0" encoding="utf-8"?>
+<file path=ppt/slides/slide12.xml><?xml version="1.0" encoding="utf-8"?>
 <p:sld xmlns:a="http://schemas.openxmlformats.org/drawingml/2006/main" xmlns:r="http://schemas.openxmlformats.org/officeDocument/2006/relationships" xmlns:p="http://schemas.openxmlformats.org/presentationml/2006/main">
   <p:cSld>
     <p:spTree>
@@ -11179,6 +11648,196 @@
           <p:cNvPr id="2" name="标题 1">
             <a:extLst>
               <a:ext uri="{FF2B5EF4-FFF2-40B4-BE49-F238E27FC236}">
+                <a16:creationId xmlns:a16="http://schemas.microsoft.com/office/drawing/2014/main" id="{F8251E88-F0F6-4CE6-B459-1504045ED546}"/>
+              </a:ext>
+            </a:extLst>
+          </p:cNvPr>
+          <p:cNvSpPr>
+            <a:spLocks noGrp="1"/>
+          </p:cNvSpPr>
+          <p:nvPr>
+            <p:ph type="title"/>
+          </p:nvPr>
+        </p:nvSpPr>
+        <p:spPr/>
+        <p:txBody>
+          <a:bodyPr/>
+          <a:lstStyle/>
+          <a:p>
+            <a:r>
+              <a:rPr lang="en-US" dirty="0"/>
+              <a:t>What is a Documentation?</a:t>
+            </a:r>
+          </a:p>
+        </p:txBody>
+      </p:sp>
+      <p:sp>
+        <p:nvSpPr>
+          <p:cNvPr id="17" name="文本框 16">
+            <a:extLst>
+              <a:ext uri="{FF2B5EF4-FFF2-40B4-BE49-F238E27FC236}">
+                <a16:creationId xmlns:a16="http://schemas.microsoft.com/office/drawing/2014/main" id="{2543B0DA-FF8D-4E0F-BD95-C496737EF461}"/>
+              </a:ext>
+            </a:extLst>
+          </p:cNvPr>
+          <p:cNvSpPr txBox="1"/>
+          <p:nvPr/>
+        </p:nvSpPr>
+        <p:spPr>
+          <a:xfrm>
+            <a:off x="961183" y="1735233"/>
+            <a:ext cx="10305076" cy="3416320"/>
+          </a:xfrm>
+          <a:prstGeom prst="rect">
+            <a:avLst/>
+          </a:prstGeom>
+          <a:noFill/>
+        </p:spPr>
+        <p:txBody>
+          <a:bodyPr wrap="square" rtlCol="0">
+            <a:spAutoFit/>
+          </a:bodyPr>
+          <a:lstStyle/>
+          <a:p>
+            <a:r>
+              <a:rPr lang="en-US" dirty="0"/>
+              <a:t>Frequently u</a:t>
+            </a:r>
+            <a:r>
+              <a:rPr lang="en-US" altLang="zh-CN" dirty="0"/>
+              <a:t>sed for – </a:t>
+            </a:r>
+          </a:p>
+          <a:p>
+            <a:pPr marL="285750" indent="-285750">
+              <a:buFont typeface="Arial" panose="020B0604020202020204" pitchFamily="34" charset="0"/>
+              <a:buChar char="•"/>
+            </a:pPr>
+            <a:r>
+              <a:rPr lang="en-US" altLang="zh-CN" dirty="0"/>
+              <a:t>Astronomy data products.</a:t>
+            </a:r>
+          </a:p>
+          <a:p>
+            <a:pPr marL="285750" indent="-285750">
+              <a:buFont typeface="Arial" panose="020B0604020202020204" pitchFamily="34" charset="0"/>
+              <a:buChar char="•"/>
+            </a:pPr>
+            <a:r>
+              <a:rPr lang="en-US" altLang="zh-CN" dirty="0"/>
+              <a:t>Project introduction.</a:t>
+            </a:r>
+          </a:p>
+          <a:p>
+            <a:pPr marL="285750" indent="-285750">
+              <a:buFont typeface="Arial" panose="020B0604020202020204" pitchFamily="34" charset="0"/>
+              <a:buChar char="•"/>
+            </a:pPr>
+            <a:r>
+              <a:rPr lang="en-US" altLang="zh-CN" dirty="0"/>
+              <a:t>Software/code tutorial and reference manual.</a:t>
+            </a:r>
+          </a:p>
+          <a:p>
+            <a:pPr marL="285750" indent="-285750">
+              <a:buFont typeface="Arial" panose="020B0604020202020204" pitchFamily="34" charset="0"/>
+              <a:buChar char="•"/>
+            </a:pPr>
+            <a:r>
+              <a:rPr lang="en-US" altLang="zh-CN" dirty="0"/>
+              <a:t>Supplementary material of papers.</a:t>
+            </a:r>
+          </a:p>
+          <a:p>
+            <a:pPr marL="285750" indent="-285750">
+              <a:buFont typeface="Arial" panose="020B0604020202020204" pitchFamily="34" charset="0"/>
+              <a:buChar char="•"/>
+            </a:pPr>
+            <a:r>
+              <a:rPr lang="en-US" altLang="zh-CN" dirty="0"/>
+              <a:t>...</a:t>
+            </a:r>
+          </a:p>
+          <a:p>
+            <a:pPr marL="285750" indent="-285750">
+              <a:buFont typeface="Arial" panose="020B0604020202020204" pitchFamily="34" charset="0"/>
+              <a:buChar char="•"/>
+            </a:pPr>
+            <a:endParaRPr lang="en-US" altLang="zh-CN" dirty="0"/>
+          </a:p>
+          <a:p>
+            <a:pPr marL="285750" indent="-285750">
+              <a:buFont typeface="Arial" panose="020B0604020202020204" pitchFamily="34" charset="0"/>
+              <a:buChar char="•"/>
+            </a:pPr>
+            <a:endParaRPr lang="en-US" altLang="zh-CN" dirty="0"/>
+          </a:p>
+          <a:p>
+            <a:r>
+              <a:rPr lang="en-US" altLang="zh-CN" dirty="0"/>
+              <a:t>Why it is important ?</a:t>
+            </a:r>
+          </a:p>
+          <a:p>
+            <a:pPr marL="285750" indent="-285750">
+              <a:buFont typeface="Arial" panose="020B0604020202020204" pitchFamily="34" charset="0"/>
+              <a:buChar char="•"/>
+            </a:pPr>
+            <a:r>
+              <a:rPr lang="en-US" altLang="zh-CN" dirty="0"/>
+              <a:t>Key for a successful project.</a:t>
+            </a:r>
+          </a:p>
+          <a:p>
+            <a:pPr marL="285750" indent="-285750">
+              <a:buFont typeface="Arial" panose="020B0604020202020204" pitchFamily="34" charset="0"/>
+              <a:buChar char="•"/>
+            </a:pPr>
+            <a:r>
+              <a:rPr lang="en-US" altLang="zh-CN" dirty="0"/>
+              <a:t>Help yourself re-think your project.</a:t>
+            </a:r>
+          </a:p>
+          <a:p>
+            <a:endParaRPr lang="en-US" dirty="0"/>
+          </a:p>
+        </p:txBody>
+      </p:sp>
+    </p:spTree>
+    <p:extLst>
+      <p:ext uri="{BB962C8B-B14F-4D97-AF65-F5344CB8AC3E}">
+        <p14:creationId xmlns:p14="http://schemas.microsoft.com/office/powerpoint/2010/main" val="1972541013"/>
+      </p:ext>
+    </p:extLst>
+  </p:cSld>
+  <p:clrMapOvr>
+    <a:masterClrMapping/>
+  </p:clrMapOvr>
+</p:sld>
+</file>
+
+<file path=ppt/slides/slide5.xml><?xml version="1.0" encoding="utf-8"?>
+<p:sld xmlns:a="http://schemas.openxmlformats.org/drawingml/2006/main" xmlns:r="http://schemas.openxmlformats.org/officeDocument/2006/relationships" xmlns:p="http://schemas.openxmlformats.org/presentationml/2006/main">
+  <p:cSld>
+    <p:spTree>
+      <p:nvGrpSpPr>
+        <p:cNvPr id="1" name=""/>
+        <p:cNvGrpSpPr/>
+        <p:nvPr/>
+      </p:nvGrpSpPr>
+      <p:grpSpPr>
+        <a:xfrm>
+          <a:off x="0" y="0"/>
+          <a:ext cx="0" cy="0"/>
+          <a:chOff x="0" y="0"/>
+          <a:chExt cx="0" cy="0"/>
+        </a:xfrm>
+      </p:grpSpPr>
+      <p:sp>
+        <p:nvSpPr>
+          <p:cNvPr id="2" name="标题 1">
+            <a:extLst>
+              <a:ext uri="{FF2B5EF4-FFF2-40B4-BE49-F238E27FC236}">
                 <a16:creationId xmlns:a16="http://schemas.microsoft.com/office/drawing/2014/main" id="{B3B47565-6822-480D-8F5B-6A7EA535E7F8}"/>
               </a:ext>
             </a:extLst>
@@ -11378,7 +12037,7 @@
 </p:sld>
 </file>
 
-<file path=ppt/slides/slide5.xml><?xml version="1.0" encoding="utf-8"?>
+<file path=ppt/slides/slide6.xml><?xml version="1.0" encoding="utf-8"?>
 <p:sld xmlns:a="http://schemas.openxmlformats.org/drawingml/2006/main" xmlns:r="http://schemas.openxmlformats.org/officeDocument/2006/relationships" xmlns:p="http://schemas.openxmlformats.org/presentationml/2006/main">
   <p:cSld>
     <p:spTree>
@@ -11538,6 +12197,10 @@
             </a:r>
           </a:p>
           <a:p>
+            <a:pPr>
+              <a:buFont typeface="Calibri" panose="020F0502020204030204" pitchFamily="34" charset="0"/>
+              <a:buChar char="×"/>
+            </a:pPr>
             <a:r>
               <a:rPr lang="en-US" dirty="0">
                 <a:solidFill>
@@ -11577,6 +12240,52 @@
                 </a:solidFill>
               </a:rPr>
               <a:t>). They are not designed for documentation.</a:t>
+            </a:r>
+          </a:p>
+        </p:txBody>
+      </p:sp>
+      <p:sp>
+        <p:nvSpPr>
+          <p:cNvPr id="4" name="文本框 3">
+            <a:extLst>
+              <a:ext uri="{FF2B5EF4-FFF2-40B4-BE49-F238E27FC236}">
+                <a16:creationId xmlns:a16="http://schemas.microsoft.com/office/drawing/2014/main" id="{5CB8F293-E016-462B-80E8-CECB138A2045}"/>
+              </a:ext>
+            </a:extLst>
+          </p:cNvPr>
+          <p:cNvSpPr txBox="1"/>
+          <p:nvPr/>
+        </p:nvSpPr>
+        <p:spPr>
+          <a:xfrm>
+            <a:off x="7651189" y="3059668"/>
+            <a:ext cx="4095661" cy="646331"/>
+          </a:xfrm>
+          <a:prstGeom prst="rect">
+            <a:avLst/>
+          </a:prstGeom>
+          <a:noFill/>
+        </p:spPr>
+        <p:txBody>
+          <a:bodyPr wrap="square" rtlCol="0">
+            <a:spAutoFit/>
+          </a:bodyPr>
+          <a:lstStyle/>
+          <a:p>
+            <a:r>
+              <a:rPr lang="en-US" dirty="0"/>
+              <a:t>+ work-sharing platforms like Git/</a:t>
+            </a:r>
+            <a:r>
+              <a:rPr lang="en-US" dirty="0" err="1"/>
+              <a:t>Github</a:t>
+            </a:r>
+            <a:endParaRPr lang="en-US" dirty="0"/>
+          </a:p>
+          <a:p>
+            <a:r>
+              <a:rPr lang="en-US" dirty="0"/>
+              <a:t>+ document host site like read-the-docs.</a:t>
             </a:r>
           </a:p>
         </p:txBody>
@@ -11594,7 +12303,7 @@
 </p:sld>
 </file>
 
-<file path=ppt/slides/slide6.xml><?xml version="1.0" encoding="utf-8"?>
+<file path=ppt/slides/slide7.xml><?xml version="1.0" encoding="utf-8"?>
 <p:sld xmlns:a="http://schemas.openxmlformats.org/drawingml/2006/main" xmlns:r="http://schemas.openxmlformats.org/officeDocument/2006/relationships" xmlns:p="http://schemas.openxmlformats.org/presentationml/2006/main">
   <p:cSld>
     <p:spTree>
@@ -11657,7 +12366,9 @@
         </p:nvSpPr>
         <p:spPr/>
         <p:txBody>
-          <a:bodyPr/>
+          <a:bodyPr>
+            <a:normAutofit lnSpcReduction="10000"/>
+          </a:bodyPr>
           <a:lstStyle/>
           <a:p>
             <a:r>
@@ -11727,7 +12438,7 @@
             <a:pPr lvl="1"/>
             <a:r>
               <a:rPr lang="en-US" dirty="0"/>
-              <a:t>Local IDE: </a:t>
+              <a:t>Local IDE: vim or </a:t>
             </a:r>
             <a:r>
               <a:rPr lang="en-US" dirty="0" err="1"/>
@@ -11882,7 +12593,7 @@
 </p:sld>
 </file>
 
-<file path=ppt/slides/slide7.xml><?xml version="1.0" encoding="utf-8"?>
+<file path=ppt/slides/slide8.xml><?xml version="1.0" encoding="utf-8"?>
 <p:sld xmlns:a="http://schemas.openxmlformats.org/drawingml/2006/main" xmlns:r="http://schemas.openxmlformats.org/officeDocument/2006/relationships" xmlns:p="http://schemas.openxmlformats.org/presentationml/2006/main">
   <p:cSld>
     <p:spTree>
@@ -12032,7 +12743,7 @@
 </p:sld>
 </file>
 
-<file path=ppt/slides/slide8.xml><?xml version="1.0" encoding="utf-8"?>
+<file path=ppt/slides/slide9.xml><?xml version="1.0" encoding="utf-8"?>
 <p:sld xmlns:a="http://schemas.openxmlformats.org/drawingml/2006/main" xmlns:r="http://schemas.openxmlformats.org/officeDocument/2006/relationships" xmlns:p="http://schemas.openxmlformats.org/presentationml/2006/main">
   <p:cSld>
     <p:spTree>
@@ -12122,12 +12833,8 @@
           </a:p>
           <a:p>
             <a:r>
-              <a:rPr lang="en-US" dirty="0" err="1"/>
-              <a:t>ools</a:t>
-            </a:r>
-            <a:r>
               <a:rPr lang="en-US" dirty="0"/>
-              <a:t> for doc-generation and doc-host.</a:t>
+              <a:t>Tools for doc-generation and doc-host.</a:t>
             </a:r>
           </a:p>
           <a:p>
@@ -12280,390 +12987,6 @@
     <p:extLst>
       <p:ext uri="{BB962C8B-B14F-4D97-AF65-F5344CB8AC3E}">
         <p14:creationId xmlns:p14="http://schemas.microsoft.com/office/powerpoint/2010/main" val="1950465733"/>
-      </p:ext>
-    </p:extLst>
-  </p:cSld>
-  <p:clrMapOvr>
-    <a:masterClrMapping/>
-  </p:clrMapOvr>
-</p:sld>
-</file>
-
-<file path=ppt/slides/slide9.xml><?xml version="1.0" encoding="utf-8"?>
-<p:sld xmlns:a="http://schemas.openxmlformats.org/drawingml/2006/main" xmlns:r="http://schemas.openxmlformats.org/officeDocument/2006/relationships" xmlns:p="http://schemas.openxmlformats.org/presentationml/2006/main">
-  <p:cSld>
-    <p:spTree>
-      <p:nvGrpSpPr>
-        <p:cNvPr id="1" name=""/>
-        <p:cNvGrpSpPr/>
-        <p:nvPr/>
-      </p:nvGrpSpPr>
-      <p:grpSpPr>
-        <a:xfrm>
-          <a:off x="0" y="0"/>
-          <a:ext cx="0" cy="0"/>
-          <a:chOff x="0" y="0"/>
-          <a:chExt cx="0" cy="0"/>
-        </a:xfrm>
-      </p:grpSpPr>
-      <p:sp>
-        <p:nvSpPr>
-          <p:cNvPr id="2" name="标题 1">
-            <a:extLst>
-              <a:ext uri="{FF2B5EF4-FFF2-40B4-BE49-F238E27FC236}">
-                <a16:creationId xmlns:a16="http://schemas.microsoft.com/office/drawing/2014/main" id="{3FE14FCF-5B8C-4C99-A6C9-A0016EF71719}"/>
-              </a:ext>
-            </a:extLst>
-          </p:cNvPr>
-          <p:cNvSpPr>
-            <a:spLocks noGrp="1"/>
-          </p:cNvSpPr>
-          <p:nvPr>
-            <p:ph type="title"/>
-          </p:nvPr>
-        </p:nvSpPr>
-        <p:spPr/>
-        <p:txBody>
-          <a:bodyPr/>
-          <a:lstStyle/>
-          <a:p>
-            <a:r>
-              <a:rPr lang="en-US" dirty="0"/>
-              <a:t>Sphinx Doc Writing – Start Your Doc</a:t>
-            </a:r>
-          </a:p>
-        </p:txBody>
-      </p:sp>
-      <p:sp>
-        <p:nvSpPr>
-          <p:cNvPr id="3" name="内容占位符 2">
-            <a:extLst>
-              <a:ext uri="{FF2B5EF4-FFF2-40B4-BE49-F238E27FC236}">
-                <a16:creationId xmlns:a16="http://schemas.microsoft.com/office/drawing/2014/main" id="{E47B3EE0-65ED-4194-94F1-A81E60912DD6}"/>
-              </a:ext>
-            </a:extLst>
-          </p:cNvPr>
-          <p:cNvSpPr>
-            <a:spLocks noGrp="1"/>
-          </p:cNvSpPr>
-          <p:nvPr>
-            <p:ph idx="1"/>
-          </p:nvPr>
-        </p:nvSpPr>
-        <p:spPr>
-          <a:xfrm>
-            <a:off x="838200" y="1825625"/>
-            <a:ext cx="5879400" cy="4351338"/>
-          </a:xfrm>
-        </p:spPr>
-        <p:txBody>
-          <a:bodyPr>
-            <a:normAutofit lnSpcReduction="10000"/>
-          </a:bodyPr>
-          <a:lstStyle/>
-          <a:p>
-            <a:r>
-              <a:rPr lang="en-US" dirty="0"/>
-              <a:t>Install required packages</a:t>
-            </a:r>
-          </a:p>
-          <a:p>
-            <a:pPr lvl="1"/>
-            <a:r>
-              <a:rPr lang="en-US" dirty="0"/>
-              <a:t>Build a new virtual environment, if possible.</a:t>
-            </a:r>
-          </a:p>
-          <a:p>
-            <a:pPr lvl="1"/>
-            <a:r>
-              <a:rPr lang="en-US" dirty="0">
-                <a:latin typeface="Consolas" panose="020B0609020204030204" pitchFamily="49" charset="0"/>
-              </a:rPr>
-              <a:t>pip</a:t>
-            </a:r>
-            <a:r>
-              <a:rPr lang="zh-CN" altLang="en-US" dirty="0">
-                <a:latin typeface="Consolas" panose="020B0609020204030204" pitchFamily="49" charset="0"/>
-              </a:rPr>
-              <a:t> </a:t>
-            </a:r>
-            <a:r>
-              <a:rPr lang="en-US" altLang="zh-CN" dirty="0">
-                <a:latin typeface="Consolas" panose="020B0609020204030204" pitchFamily="49" charset="0"/>
-              </a:rPr>
-              <a:t>install sphinx</a:t>
-            </a:r>
-            <a:r>
-              <a:rPr lang="en-US" altLang="zh-CN" dirty="0"/>
-              <a:t> </a:t>
-            </a:r>
-            <a:br>
-              <a:rPr lang="en-US" altLang="zh-CN" dirty="0"/>
-            </a:br>
-            <a:r>
-              <a:rPr lang="en-US" altLang="zh-CN" dirty="0"/>
-              <a:t>=&gt; (doc-parser library)</a:t>
-            </a:r>
-          </a:p>
-          <a:p>
-            <a:pPr lvl="1"/>
-            <a:r>
-              <a:rPr lang="en-US" dirty="0">
-                <a:latin typeface="Consolas" panose="020B0609020204030204" pitchFamily="49" charset="0"/>
-              </a:rPr>
-              <a:t>pip install sphinx-</a:t>
-            </a:r>
-            <a:r>
-              <a:rPr lang="en-US" dirty="0" err="1">
-                <a:latin typeface="Consolas" panose="020B0609020204030204" pitchFamily="49" charset="0"/>
-              </a:rPr>
-              <a:t>rtd</a:t>
-            </a:r>
-            <a:r>
-              <a:rPr lang="en-US" dirty="0">
-                <a:latin typeface="Consolas" panose="020B0609020204030204" pitchFamily="49" charset="0"/>
-              </a:rPr>
-              <a:t>-theme</a:t>
-            </a:r>
-            <a:r>
-              <a:rPr lang="en-US" dirty="0"/>
-              <a:t> </a:t>
-            </a:r>
-            <a:br>
-              <a:rPr lang="en-US" dirty="0"/>
-            </a:br>
-            <a:r>
-              <a:rPr lang="en-US" dirty="0"/>
-              <a:t>=&gt; (a widely-used theme)</a:t>
-            </a:r>
-          </a:p>
-          <a:p>
-            <a:r>
-              <a:rPr lang="en-US" dirty="0"/>
-              <a:t>Start a new Sphinx project</a:t>
-            </a:r>
-          </a:p>
-          <a:p>
-            <a:pPr lvl="1"/>
-            <a:r>
-              <a:rPr lang="en-US" dirty="0" err="1">
-                <a:latin typeface="Consolas" panose="020B0609020204030204" pitchFamily="49" charset="0"/>
-              </a:rPr>
-              <a:t>mkdir</a:t>
-            </a:r>
-            <a:r>
-              <a:rPr lang="en-US" dirty="0">
-                <a:latin typeface="Consolas" panose="020B0609020204030204" pitchFamily="49" charset="0"/>
-              </a:rPr>
-              <a:t> example &amp;&amp; cd example</a:t>
-            </a:r>
-            <a:br>
-              <a:rPr lang="en-US" dirty="0"/>
-            </a:br>
-            <a:r>
-              <a:rPr lang="en-US" altLang="zh-CN" dirty="0"/>
-              <a:t>=&gt; project root directory</a:t>
-            </a:r>
-            <a:endParaRPr lang="en-US" dirty="0"/>
-          </a:p>
-          <a:p>
-            <a:pPr lvl="1"/>
-            <a:r>
-              <a:rPr lang="en-US" dirty="0">
-                <a:latin typeface="Consolas" panose="020B0609020204030204" pitchFamily="49" charset="0"/>
-              </a:rPr>
-              <a:t>sphinx-</a:t>
-            </a:r>
-            <a:r>
-              <a:rPr lang="en-US" dirty="0" err="1">
-                <a:latin typeface="Consolas" panose="020B0609020204030204" pitchFamily="49" charset="0"/>
-              </a:rPr>
-              <a:t>quickstart</a:t>
-            </a:r>
-            <a:br>
-              <a:rPr lang="en-US" dirty="0"/>
-            </a:br>
-            <a:r>
-              <a:rPr lang="en-US" dirty="0"/>
-              <a:t>=&gt; get an empty project</a:t>
-            </a:r>
-          </a:p>
-        </p:txBody>
-      </p:sp>
-      <p:sp>
-        <p:nvSpPr>
-          <p:cNvPr id="11" name="矩形 10">
-            <a:extLst>
-              <a:ext uri="{FF2B5EF4-FFF2-40B4-BE49-F238E27FC236}">
-                <a16:creationId xmlns:a16="http://schemas.microsoft.com/office/drawing/2014/main" id="{9B8CBADC-8460-417A-8FAD-BBB0736C082B}"/>
-              </a:ext>
-            </a:extLst>
-          </p:cNvPr>
-          <p:cNvSpPr/>
-          <p:nvPr/>
-        </p:nvSpPr>
-        <p:spPr>
-          <a:xfrm>
-            <a:off x="6717600" y="2575539"/>
-            <a:ext cx="5299200" cy="2585323"/>
-          </a:xfrm>
-          <a:prstGeom prst="rect">
-            <a:avLst/>
-          </a:prstGeom>
-          <a:noFill/>
-          <a:ln w="9525" cap="flat" cmpd="sng" algn="ctr">
-            <a:solidFill>
-              <a:schemeClr val="accent1"/>
-            </a:solidFill>
-            <a:prstDash val="solid"/>
-            <a:round/>
-            <a:headEnd type="none" w="med" len="med"/>
-            <a:tailEnd type="none" w="med" len="med"/>
-          </a:ln>
-        </p:spPr>
-        <p:style>
-          <a:lnRef idx="0">
-            <a:scrgbClr r="0" g="0" b="0"/>
-          </a:lnRef>
-          <a:fillRef idx="0">
-            <a:scrgbClr r="0" g="0" b="0"/>
-          </a:fillRef>
-          <a:effectRef idx="0">
-            <a:scrgbClr r="0" g="0" b="0"/>
-          </a:effectRef>
-          <a:fontRef idx="minor">
-            <a:schemeClr val="accent1"/>
-          </a:fontRef>
-        </p:style>
-        <p:txBody>
-          <a:bodyPr wrap="square">
-            <a:spAutoFit/>
-          </a:bodyPr>
-          <a:lstStyle/>
-          <a:p>
-            <a:r>
-              <a:rPr lang="en-US" altLang="zh-CN" dirty="0">
-                <a:latin typeface="Consolas" panose="020B0609020204030204" pitchFamily="49" charset="0"/>
-              </a:rPr>
-              <a:t># Project layout after sphinx-</a:t>
-            </a:r>
-            <a:r>
-              <a:rPr lang="en-US" altLang="zh-CN" dirty="0" err="1">
-                <a:latin typeface="Consolas" panose="020B0609020204030204" pitchFamily="49" charset="0"/>
-              </a:rPr>
-              <a:t>quickstart</a:t>
-            </a:r>
-            <a:endParaRPr lang="en-US" altLang="zh-CN" dirty="0">
-              <a:latin typeface="Consolas" panose="020B0609020204030204" pitchFamily="49" charset="0"/>
-            </a:endParaRPr>
-          </a:p>
-          <a:p>
-            <a:r>
-              <a:rPr lang="en-US" altLang="zh-CN" dirty="0">
-                <a:latin typeface="Consolas" panose="020B0609020204030204" pitchFamily="49" charset="0"/>
-              </a:rPr>
-              <a:t>example</a:t>
-            </a:r>
-            <a:br>
-              <a:rPr lang="en-US" altLang="zh-CN" dirty="0">
-                <a:latin typeface="Consolas" panose="020B0609020204030204" pitchFamily="49" charset="0"/>
-              </a:rPr>
-            </a:br>
-            <a:r>
-              <a:rPr lang="en-US" altLang="zh-CN" dirty="0">
-                <a:latin typeface="Consolas" panose="020B0609020204030204" pitchFamily="49" charset="0"/>
-              </a:rPr>
-              <a:t>  |- _build/</a:t>
-            </a:r>
-            <a:br>
-              <a:rPr lang="en-US" altLang="zh-CN" dirty="0">
-                <a:latin typeface="Consolas" panose="020B0609020204030204" pitchFamily="49" charset="0"/>
-              </a:rPr>
-            </a:br>
-            <a:r>
-              <a:rPr lang="en-US" altLang="zh-CN" dirty="0">
-                <a:latin typeface="Consolas" panose="020B0609020204030204" pitchFamily="49" charset="0"/>
-              </a:rPr>
-              <a:t>  |- _static/</a:t>
-            </a:r>
-            <a:br>
-              <a:rPr lang="en-US" altLang="zh-CN" dirty="0">
-                <a:latin typeface="Consolas" panose="020B0609020204030204" pitchFamily="49" charset="0"/>
-              </a:rPr>
-            </a:br>
-            <a:r>
-              <a:rPr lang="en-US" altLang="zh-CN" dirty="0">
-                <a:latin typeface="Consolas" panose="020B0609020204030204" pitchFamily="49" charset="0"/>
-              </a:rPr>
-              <a:t>  |- _templates/</a:t>
-            </a:r>
-            <a:br>
-              <a:rPr lang="en-US" altLang="zh-CN" dirty="0">
-                <a:latin typeface="Consolas" panose="020B0609020204030204" pitchFamily="49" charset="0"/>
-              </a:rPr>
-            </a:br>
-            <a:r>
-              <a:rPr lang="en-US" altLang="zh-CN" dirty="0">
-                <a:latin typeface="Consolas" panose="020B0609020204030204" pitchFamily="49" charset="0"/>
-              </a:rPr>
-              <a:t>  |- conf.py</a:t>
-            </a:r>
-            <a:br>
-              <a:rPr lang="en-US" altLang="zh-CN" dirty="0">
-                <a:latin typeface="Consolas" panose="020B0609020204030204" pitchFamily="49" charset="0"/>
-              </a:rPr>
-            </a:br>
-            <a:r>
-              <a:rPr lang="en-US" altLang="zh-CN" dirty="0">
-                <a:latin typeface="Consolas" panose="020B0609020204030204" pitchFamily="49" charset="0"/>
-              </a:rPr>
-              <a:t>  |- </a:t>
-            </a:r>
-            <a:r>
-              <a:rPr lang="en-US" altLang="zh-CN" dirty="0" err="1">
-                <a:latin typeface="Consolas" panose="020B0609020204030204" pitchFamily="49" charset="0"/>
-              </a:rPr>
-              <a:t>index.rst</a:t>
-            </a:r>
-            <a:br>
-              <a:rPr lang="en-US" altLang="zh-CN" dirty="0">
-                <a:latin typeface="Consolas" panose="020B0609020204030204" pitchFamily="49" charset="0"/>
-              </a:rPr>
-            </a:br>
-            <a:r>
-              <a:rPr lang="en-US" altLang="zh-CN" dirty="0">
-                <a:latin typeface="Consolas" panose="020B0609020204030204" pitchFamily="49" charset="0"/>
-              </a:rPr>
-              <a:t>  |- make.bat</a:t>
-            </a:r>
-            <a:br>
-              <a:rPr lang="en-US" altLang="zh-CN" dirty="0">
-                <a:latin typeface="Consolas" panose="020B0609020204030204" pitchFamily="49" charset="0"/>
-              </a:rPr>
-            </a:br>
-            <a:r>
-              <a:rPr lang="en-US" altLang="zh-CN" dirty="0">
-                <a:latin typeface="Consolas" panose="020B0609020204030204" pitchFamily="49" charset="0"/>
-              </a:rPr>
-              <a:t>  |- </a:t>
-            </a:r>
-            <a:r>
-              <a:rPr lang="en-US" altLang="zh-CN" dirty="0" err="1">
-                <a:latin typeface="Consolas" panose="020B0609020204030204" pitchFamily="49" charset="0"/>
-              </a:rPr>
-              <a:t>Makefile</a:t>
-            </a:r>
-            <a:endParaRPr lang="zh-CN" altLang="en-US" dirty="0">
-              <a:latin typeface="Consolas" panose="020B0609020204030204" pitchFamily="49" charset="0"/>
-            </a:endParaRPr>
-          </a:p>
-        </p:txBody>
-      </p:sp>
-    </p:spTree>
-    <p:extLst>
-      <p:ext uri="{BB962C8B-B14F-4D97-AF65-F5344CB8AC3E}">
-        <p14:creationId xmlns:p14="http://schemas.microsoft.com/office/powerpoint/2010/main" val="2766636"/>
       </p:ext>
     </p:extLst>
   </p:cSld>

</xml_diff>